<commit_message>
M2 - Presentation May2a
</commit_message>
<xml_diff>
--- a/CSML1010_Group3_Project_Milestone02.pptx
+++ b/CSML1010_Group3_Project_Milestone02.pptx
@@ -5,7 +5,7 @@
     <p:sldMasterId id="2147483648" r:id="rId1"/>
   </p:sldMasterIdLst>
   <p:notesMasterIdLst>
-    <p:notesMasterId r:id="rId22"/>
+    <p:notesMasterId r:id="rId21"/>
   </p:notesMasterIdLst>
   <p:sldIdLst>
     <p:sldId id="257" r:id="rId2"/>
@@ -23,11 +23,10 @@
     <p:sldId id="303" r:id="rId14"/>
     <p:sldId id="310" r:id="rId15"/>
     <p:sldId id="307" r:id="rId16"/>
-    <p:sldId id="309" r:id="rId17"/>
+    <p:sldId id="312" r:id="rId17"/>
     <p:sldId id="305" r:id="rId18"/>
-    <p:sldId id="308" r:id="rId19"/>
-    <p:sldId id="311" r:id="rId20"/>
-    <p:sldId id="296" r:id="rId21"/>
+    <p:sldId id="311" r:id="rId19"/>
+    <p:sldId id="296" r:id="rId20"/>
   </p:sldIdLst>
   <p:sldSz cx="12192000" cy="6858000"/>
   <p:notesSz cx="6858000" cy="9144000"/>
@@ -3584,7 +3583,7 @@
           <a:p>
             <a:fld id="{E6317E0B-A3D3-495C-A4A5-504BD0130225}" type="datetimeFigureOut">
               <a:rPr lang="en-CA" smtClean="0"/>
-              <a:t>2020-05-01</a:t>
+              <a:t>2020-05-02</a:t>
             </a:fld>
             <a:endParaRPr lang="en-CA"/>
           </a:p>
@@ -3980,10 +3979,7 @@
           <a:bodyPr/>
           <a:lstStyle/>
           <a:p>
-            <a:r>
-              <a:rPr lang="en-US" dirty="0"/>
-              <a:t>TODO:  </a:t>
-            </a:r>
+            <a:endParaRPr lang="en-US" dirty="0"/>
           </a:p>
         </p:txBody>
       </p:sp>
@@ -4067,10 +4063,7 @@
           <a:bodyPr/>
           <a:lstStyle/>
           <a:p>
-            <a:r>
-              <a:rPr lang="en-US" dirty="0"/>
-              <a:t>TODO: </a:t>
-            </a:r>
+            <a:endParaRPr lang="en-US" dirty="0"/>
           </a:p>
         </p:txBody>
       </p:sp>
@@ -4154,10 +4147,7 @@
           <a:bodyPr/>
           <a:lstStyle/>
           <a:p>
-            <a:r>
-              <a:rPr lang="en-US" dirty="0"/>
-              <a:t>TODO: </a:t>
-            </a:r>
+            <a:endParaRPr lang="en-US" dirty="0"/>
           </a:p>
         </p:txBody>
       </p:sp>
@@ -4241,10 +4231,7 @@
           <a:bodyPr/>
           <a:lstStyle/>
           <a:p>
-            <a:r>
-              <a:rPr lang="en-US" dirty="0"/>
-              <a:t>TODO: </a:t>
-            </a:r>
+            <a:endParaRPr lang="en-US" dirty="0"/>
           </a:p>
         </p:txBody>
       </p:sp>
@@ -4328,10 +4315,7 @@
           <a:bodyPr/>
           <a:lstStyle/>
           <a:p>
-            <a:r>
-              <a:rPr lang="en-US" dirty="0"/>
-              <a:t>TODO: </a:t>
-            </a:r>
+            <a:endParaRPr lang="en-US" dirty="0"/>
           </a:p>
         </p:txBody>
       </p:sp>
@@ -4415,10 +4399,7 @@
           <a:bodyPr/>
           <a:lstStyle/>
           <a:p>
-            <a:r>
-              <a:rPr lang="en-US" dirty="0"/>
-              <a:t>TODO: </a:t>
-            </a:r>
+            <a:endParaRPr lang="en-US" dirty="0"/>
           </a:p>
         </p:txBody>
       </p:sp>
@@ -4502,10 +4483,7 @@
           <a:bodyPr/>
           <a:lstStyle/>
           <a:p>
-            <a:r>
-              <a:rPr lang="en-US" dirty="0"/>
-              <a:t>TODO: </a:t>
-            </a:r>
+            <a:endParaRPr lang="en-CA" dirty="0"/>
           </a:p>
         </p:txBody>
       </p:sp>
@@ -4526,7 +4504,7 @@
           <a:p>
             <a:fld id="{CFED61B6-4A00-4DBB-8E9B-BCC4333A0018}" type="slidenum">
               <a:rPr lang="en-CA" smtClean="0"/>
-              <a:t>17</a:t>
+              <a:t>16</a:t>
             </a:fld>
             <a:endParaRPr lang="en-CA"/>
           </a:p>
@@ -4535,7 +4513,7 @@
     </p:spTree>
     <p:extLst>
       <p:ext uri="{BB962C8B-B14F-4D97-AF65-F5344CB8AC3E}">
-        <p14:creationId xmlns:p14="http://schemas.microsoft.com/office/powerpoint/2010/main" val="2857454703"/>
+        <p14:creationId xmlns:p14="http://schemas.microsoft.com/office/powerpoint/2010/main" val="3602966563"/>
       </p:ext>
     </p:extLst>
   </p:cSld>
@@ -4589,10 +4567,7 @@
           <a:bodyPr/>
           <a:lstStyle/>
           <a:p>
-            <a:r>
-              <a:rPr lang="en-US" dirty="0"/>
-              <a:t>TODO: </a:t>
-            </a:r>
+            <a:endParaRPr lang="en-US" dirty="0"/>
           </a:p>
         </p:txBody>
       </p:sp>
@@ -4613,7 +4588,7 @@
           <a:p>
             <a:fld id="{CFED61B6-4A00-4DBB-8E9B-BCC4333A0018}" type="slidenum">
               <a:rPr lang="en-CA" smtClean="0"/>
-              <a:t>18</a:t>
+              <a:t>17</a:t>
             </a:fld>
             <a:endParaRPr lang="en-CA"/>
           </a:p>
@@ -4622,7 +4597,7 @@
     </p:spTree>
     <p:extLst>
       <p:ext uri="{BB962C8B-B14F-4D97-AF65-F5344CB8AC3E}">
-        <p14:creationId xmlns:p14="http://schemas.microsoft.com/office/powerpoint/2010/main" val="2425153656"/>
+        <p14:creationId xmlns:p14="http://schemas.microsoft.com/office/powerpoint/2010/main" val="2857454703"/>
       </p:ext>
     </p:extLst>
   </p:cSld>
@@ -4713,7 +4688,7 @@
           <a:p>
             <a:fld id="{CFED61B6-4A00-4DBB-8E9B-BCC4333A0018}" type="slidenum">
               <a:rPr lang="en-CA" smtClean="0"/>
-              <a:t>20</a:t>
+              <a:t>19</a:t>
             </a:fld>
             <a:endParaRPr lang="en-CA"/>
           </a:p>
@@ -5028,10 +5003,7 @@
           <a:bodyPr/>
           <a:lstStyle/>
           <a:p>
-            <a:r>
-              <a:rPr lang="en-US" dirty="0"/>
-              <a:t>]</a:t>
-            </a:r>
+            <a:endParaRPr lang="en-US" dirty="0"/>
           </a:p>
           <a:p>
             <a:endParaRPr lang="en-CA" dirty="0"/>
@@ -5370,22 +5342,6 @@
           <a:bodyPr/>
           <a:lstStyle/>
           <a:p>
-            <a:r>
-              <a:rPr lang="en-US" dirty="0"/>
-              <a:t>TODO: </a:t>
-            </a:r>
-          </a:p>
-          <a:p>
-            <a:r>
-              <a:rPr lang="en-US" dirty="0"/>
-              <a:t>Review Title “Models Benchmark Comparison” is this ok?</a:t>
-            </a:r>
-          </a:p>
-          <a:p>
-            <a:r>
-              <a:rPr lang="en-US" dirty="0"/>
-              <a:t>Change the graph with the last run with the stops included</a:t>
-            </a:r>
             <a:endParaRPr lang="en-CA" dirty="0"/>
           </a:p>
         </p:txBody>
@@ -5575,7 +5531,7 @@
           <a:p>
             <a:fld id="{41214EFD-F6C2-4FF2-A372-B412D13DB261}" type="datetimeFigureOut">
               <a:rPr lang="en-CA" smtClean="0"/>
-              <a:t>2020-05-01</a:t>
+              <a:t>2020-05-02</a:t>
             </a:fld>
             <a:endParaRPr lang="en-CA"/>
           </a:p>
@@ -5775,7 +5731,7 @@
           <a:p>
             <a:fld id="{41214EFD-F6C2-4FF2-A372-B412D13DB261}" type="datetimeFigureOut">
               <a:rPr lang="en-CA" smtClean="0"/>
-              <a:t>2020-05-01</a:t>
+              <a:t>2020-05-02</a:t>
             </a:fld>
             <a:endParaRPr lang="en-CA"/>
           </a:p>
@@ -5985,7 +5941,7 @@
           <a:p>
             <a:fld id="{41214EFD-F6C2-4FF2-A372-B412D13DB261}" type="datetimeFigureOut">
               <a:rPr lang="en-CA" smtClean="0"/>
-              <a:t>2020-05-01</a:t>
+              <a:t>2020-05-02</a:t>
             </a:fld>
             <a:endParaRPr lang="en-CA"/>
           </a:p>
@@ -6185,7 +6141,7 @@
           <a:p>
             <a:fld id="{41214EFD-F6C2-4FF2-A372-B412D13DB261}" type="datetimeFigureOut">
               <a:rPr lang="en-CA" smtClean="0"/>
-              <a:t>2020-05-01</a:t>
+              <a:t>2020-05-02</a:t>
             </a:fld>
             <a:endParaRPr lang="en-CA"/>
           </a:p>
@@ -6461,7 +6417,7 @@
           <a:p>
             <a:fld id="{41214EFD-F6C2-4FF2-A372-B412D13DB261}" type="datetimeFigureOut">
               <a:rPr lang="en-CA" smtClean="0"/>
-              <a:t>2020-05-01</a:t>
+              <a:t>2020-05-02</a:t>
             </a:fld>
             <a:endParaRPr lang="en-CA"/>
           </a:p>
@@ -6729,7 +6685,7 @@
           <a:p>
             <a:fld id="{41214EFD-F6C2-4FF2-A372-B412D13DB261}" type="datetimeFigureOut">
               <a:rPr lang="en-CA" smtClean="0"/>
-              <a:t>2020-05-01</a:t>
+              <a:t>2020-05-02</a:t>
             </a:fld>
             <a:endParaRPr lang="en-CA"/>
           </a:p>
@@ -7144,7 +7100,7 @@
           <a:p>
             <a:fld id="{41214EFD-F6C2-4FF2-A372-B412D13DB261}" type="datetimeFigureOut">
               <a:rPr lang="en-CA" smtClean="0"/>
-              <a:t>2020-05-01</a:t>
+              <a:t>2020-05-02</a:t>
             </a:fld>
             <a:endParaRPr lang="en-CA"/>
           </a:p>
@@ -7286,7 +7242,7 @@
           <a:p>
             <a:fld id="{41214EFD-F6C2-4FF2-A372-B412D13DB261}" type="datetimeFigureOut">
               <a:rPr lang="en-CA" smtClean="0"/>
-              <a:t>2020-05-01</a:t>
+              <a:t>2020-05-02</a:t>
             </a:fld>
             <a:endParaRPr lang="en-CA"/>
           </a:p>
@@ -7399,7 +7355,7 @@
           <a:p>
             <a:fld id="{41214EFD-F6C2-4FF2-A372-B412D13DB261}" type="datetimeFigureOut">
               <a:rPr lang="en-CA" smtClean="0"/>
-              <a:t>2020-05-01</a:t>
+              <a:t>2020-05-02</a:t>
             </a:fld>
             <a:endParaRPr lang="en-CA"/>
           </a:p>
@@ -7712,7 +7668,7 @@
           <a:p>
             <a:fld id="{41214EFD-F6C2-4FF2-A372-B412D13DB261}" type="datetimeFigureOut">
               <a:rPr lang="en-CA" smtClean="0"/>
-              <a:t>2020-05-01</a:t>
+              <a:t>2020-05-02</a:t>
             </a:fld>
             <a:endParaRPr lang="en-CA"/>
           </a:p>
@@ -8001,7 +7957,7 @@
           <a:p>
             <a:fld id="{41214EFD-F6C2-4FF2-A372-B412D13DB261}" type="datetimeFigureOut">
               <a:rPr lang="en-CA" smtClean="0"/>
-              <a:t>2020-05-01</a:t>
+              <a:t>2020-05-02</a:t>
             </a:fld>
             <a:endParaRPr lang="en-CA"/>
           </a:p>
@@ -8244,7 +8200,7 @@
           <a:p>
             <a:fld id="{41214EFD-F6C2-4FF2-A372-B412D13DB261}" type="datetimeFigureOut">
               <a:rPr lang="en-CA" smtClean="0"/>
-              <a:t>2020-05-01</a:t>
+              <a:t>2020-05-02</a:t>
             </a:fld>
             <a:endParaRPr lang="en-CA"/>
           </a:p>
@@ -9183,7 +9139,7 @@
           <p:cNvPr id="3" name="Picture 2">
             <a:extLst>
               <a:ext uri="{FF2B5EF4-FFF2-40B4-BE49-F238E27FC236}">
-                <a16:creationId xmlns:a16="http://schemas.microsoft.com/office/drawing/2014/main" id="{C5D7438A-7CA2-471E-81EF-38A3137A6E88}"/>
+                <a16:creationId xmlns:a16="http://schemas.microsoft.com/office/drawing/2014/main" id="{02A824D1-C636-425B-B989-A0F3E3885160}"/>
               </a:ext>
             </a:extLst>
           </p:cNvPr>
@@ -9200,8 +9156,8 @@
         </p:blipFill>
         <p:spPr>
           <a:xfrm>
-            <a:off x="4402036" y="1552352"/>
-            <a:ext cx="7549580" cy="3067273"/>
+            <a:off x="4161875" y="1496083"/>
+            <a:ext cx="7906853" cy="4706007"/>
           </a:xfrm>
           <a:prstGeom prst="rect">
             <a:avLst/>
@@ -9522,10 +9478,10 @@
       </p:sp>
       <p:pic>
         <p:nvPicPr>
-          <p:cNvPr id="3" name="Picture 2">
+          <p:cNvPr id="5" name="Picture 4">
             <a:extLst>
               <a:ext uri="{FF2B5EF4-FFF2-40B4-BE49-F238E27FC236}">
-                <a16:creationId xmlns:a16="http://schemas.microsoft.com/office/drawing/2014/main" id="{DC3BF707-CA06-4C48-AECB-75A0E15A9779}"/>
+                <a16:creationId xmlns:a16="http://schemas.microsoft.com/office/drawing/2014/main" id="{381D9BBB-A441-4F06-BCC9-9BCF0E4115F4}"/>
               </a:ext>
             </a:extLst>
           </p:cNvPr>
@@ -9542,8 +9498,8 @@
         </p:blipFill>
         <p:spPr>
           <a:xfrm>
-            <a:off x="507788" y="1066800"/>
-            <a:ext cx="5557828" cy="2623980"/>
+            <a:off x="410700" y="1064411"/>
+            <a:ext cx="5422899" cy="2636403"/>
           </a:xfrm>
           <a:prstGeom prst="rect">
             <a:avLst/>
@@ -9552,10 +9508,10 @@
       </p:pic>
       <p:pic>
         <p:nvPicPr>
-          <p:cNvPr id="4" name="Picture 3">
+          <p:cNvPr id="6" name="Picture 5">
             <a:extLst>
               <a:ext uri="{FF2B5EF4-FFF2-40B4-BE49-F238E27FC236}">
-                <a16:creationId xmlns:a16="http://schemas.microsoft.com/office/drawing/2014/main" id="{143D5220-3964-4AF3-BCD1-1BE0C76E0808}"/>
+                <a16:creationId xmlns:a16="http://schemas.microsoft.com/office/drawing/2014/main" id="{B8F0C83D-D584-43E7-9DEE-F5DC2308D46E}"/>
               </a:ext>
             </a:extLst>
           </p:cNvPr>
@@ -9572,8 +9528,8 @@
         </p:blipFill>
         <p:spPr>
           <a:xfrm>
-            <a:off x="6096000" y="1066800"/>
-            <a:ext cx="5829161" cy="2733675"/>
+            <a:off x="6090962" y="1081599"/>
+            <a:ext cx="5422899" cy="2616826"/>
           </a:xfrm>
           <a:prstGeom prst="rect">
             <a:avLst/>
@@ -9924,10 +9880,10 @@
       </p:sp>
       <p:pic>
         <p:nvPicPr>
-          <p:cNvPr id="3" name="Picture 2">
+          <p:cNvPr id="5" name="Picture 4">
             <a:extLst>
               <a:ext uri="{FF2B5EF4-FFF2-40B4-BE49-F238E27FC236}">
-                <a16:creationId xmlns:a16="http://schemas.microsoft.com/office/drawing/2014/main" id="{503986C3-F44C-4C6D-A4A2-F1B8D682104F}"/>
+                <a16:creationId xmlns:a16="http://schemas.microsoft.com/office/drawing/2014/main" id="{27EFBD20-E187-4A99-90A6-7B972A119C33}"/>
               </a:ext>
             </a:extLst>
           </p:cNvPr>
@@ -9944,8 +9900,8 @@
         </p:blipFill>
         <p:spPr>
           <a:xfrm>
-            <a:off x="354942" y="1072690"/>
-            <a:ext cx="5566392" cy="2590236"/>
+            <a:off x="315134" y="1072690"/>
+            <a:ext cx="5624027" cy="2710375"/>
           </a:xfrm>
           <a:prstGeom prst="rect">
             <a:avLst/>
@@ -9954,10 +9910,10 @@
       </p:pic>
       <p:pic>
         <p:nvPicPr>
-          <p:cNvPr id="4" name="Picture 3">
+          <p:cNvPr id="10" name="Picture 9">
             <a:extLst>
               <a:ext uri="{FF2B5EF4-FFF2-40B4-BE49-F238E27FC236}">
-                <a16:creationId xmlns:a16="http://schemas.microsoft.com/office/drawing/2014/main" id="{C7E3C798-0343-4254-888D-5F250AB4B186}"/>
+                <a16:creationId xmlns:a16="http://schemas.microsoft.com/office/drawing/2014/main" id="{2D79023F-A9A7-4242-A8B8-3F78A203CC9A}"/>
               </a:ext>
             </a:extLst>
           </p:cNvPr>
@@ -9974,8 +9930,8 @@
         </p:blipFill>
         <p:spPr>
           <a:xfrm>
-            <a:off x="6096000" y="1072690"/>
-            <a:ext cx="5496985" cy="2590236"/>
+            <a:off x="5933283" y="1072690"/>
+            <a:ext cx="5694778" cy="2708243"/>
           </a:xfrm>
           <a:prstGeom prst="rect">
             <a:avLst/>
@@ -10062,7 +10018,7 @@
         </p:nvSpPr>
         <p:spPr>
           <a:xfrm flipH="1">
-            <a:off x="1676399" y="6229128"/>
+            <a:off x="1459237" y="6229128"/>
             <a:ext cx="3644899" cy="369332"/>
           </a:xfrm>
           <a:prstGeom prst="rect">
@@ -10122,10 +10078,10 @@
       </p:sp>
       <p:pic>
         <p:nvPicPr>
-          <p:cNvPr id="3" name="Picture 2">
+          <p:cNvPr id="5" name="Picture 4">
             <a:extLst>
               <a:ext uri="{FF2B5EF4-FFF2-40B4-BE49-F238E27FC236}">
-                <a16:creationId xmlns:a16="http://schemas.microsoft.com/office/drawing/2014/main" id="{7F7EBF42-523F-499C-A009-13762C2C975C}"/>
+                <a16:creationId xmlns:a16="http://schemas.microsoft.com/office/drawing/2014/main" id="{C4F07813-BB0F-4BE8-B398-6F5B8101506F}"/>
               </a:ext>
             </a:extLst>
           </p:cNvPr>
@@ -10142,8 +10098,8 @@
         </p:blipFill>
         <p:spPr>
           <a:xfrm>
-            <a:off x="612772" y="901700"/>
-            <a:ext cx="5483228" cy="5211332"/>
+            <a:off x="457075" y="899755"/>
+            <a:ext cx="5370621" cy="5265443"/>
           </a:xfrm>
           <a:prstGeom prst="rect">
             <a:avLst/>
@@ -10152,10 +10108,10 @@
       </p:pic>
       <p:pic>
         <p:nvPicPr>
-          <p:cNvPr id="4" name="Picture 3">
+          <p:cNvPr id="6" name="Picture 5">
             <a:extLst>
               <a:ext uri="{FF2B5EF4-FFF2-40B4-BE49-F238E27FC236}">
-                <a16:creationId xmlns:a16="http://schemas.microsoft.com/office/drawing/2014/main" id="{76835456-DFCA-4B56-B2D4-67DEA8A72A22}"/>
+                <a16:creationId xmlns:a16="http://schemas.microsoft.com/office/drawing/2014/main" id="{27CC5F11-6C19-40B2-88A7-F8647D311F68}"/>
               </a:ext>
             </a:extLst>
           </p:cNvPr>
@@ -10172,8 +10128,8 @@
         </p:blipFill>
         <p:spPr>
           <a:xfrm>
-            <a:off x="6096001" y="901700"/>
-            <a:ext cx="5483228" cy="5261552"/>
+            <a:off x="6364306" y="899755"/>
+            <a:ext cx="5370621" cy="5175089"/>
           </a:xfrm>
           <a:prstGeom prst="rect">
             <a:avLst/>
@@ -10320,10 +10276,10 @@
       </p:sp>
       <p:pic>
         <p:nvPicPr>
-          <p:cNvPr id="5" name="Picture 4">
+          <p:cNvPr id="3" name="Picture 2">
             <a:extLst>
               <a:ext uri="{FF2B5EF4-FFF2-40B4-BE49-F238E27FC236}">
-                <a16:creationId xmlns:a16="http://schemas.microsoft.com/office/drawing/2014/main" id="{9110FA96-8120-4F78-9EC1-4B3EFE83B106}"/>
+                <a16:creationId xmlns:a16="http://schemas.microsoft.com/office/drawing/2014/main" id="{0FFB37A8-198F-4802-861D-63F61A573B76}"/>
               </a:ext>
             </a:extLst>
           </p:cNvPr>
@@ -10340,8 +10296,8 @@
         </p:blipFill>
         <p:spPr>
           <a:xfrm>
-            <a:off x="368166" y="901700"/>
-            <a:ext cx="5603454" cy="5400675"/>
+            <a:off x="398339" y="901138"/>
+            <a:ext cx="5441643" cy="5328554"/>
           </a:xfrm>
           <a:prstGeom prst="rect">
             <a:avLst/>
@@ -10350,10 +10306,10 @@
       </p:pic>
       <p:pic>
         <p:nvPicPr>
-          <p:cNvPr id="6" name="Picture 5">
+          <p:cNvPr id="4" name="Picture 3">
             <a:extLst>
               <a:ext uri="{FF2B5EF4-FFF2-40B4-BE49-F238E27FC236}">
-                <a16:creationId xmlns:a16="http://schemas.microsoft.com/office/drawing/2014/main" id="{F8F1566F-F02A-45A6-971F-706E1383F152}"/>
+                <a16:creationId xmlns:a16="http://schemas.microsoft.com/office/drawing/2014/main" id="{7B68FFDA-C27C-4EAD-9A75-229AEEE4354D}"/>
               </a:ext>
             </a:extLst>
           </p:cNvPr>
@@ -10370,8 +10326,8 @@
         </p:blipFill>
         <p:spPr>
           <a:xfrm>
-            <a:off x="5971621" y="901701"/>
-            <a:ext cx="5737230" cy="5327428"/>
+            <a:off x="6095999" y="901138"/>
+            <a:ext cx="5624355" cy="5327990"/>
           </a:xfrm>
           <a:prstGeom prst="rect">
             <a:avLst/>
@@ -10559,10 +10515,10 @@
       </p:sp>
       <p:pic>
         <p:nvPicPr>
-          <p:cNvPr id="3" name="Picture 2">
+          <p:cNvPr id="5" name="Picture 4">
             <a:extLst>
               <a:ext uri="{FF2B5EF4-FFF2-40B4-BE49-F238E27FC236}">
-                <a16:creationId xmlns:a16="http://schemas.microsoft.com/office/drawing/2014/main" id="{F99A2E08-FF64-4972-8701-5632655456B9}"/>
+                <a16:creationId xmlns:a16="http://schemas.microsoft.com/office/drawing/2014/main" id="{08EC92B1-C402-4306-9F4F-2ED6CE20DF6F}"/>
               </a:ext>
             </a:extLst>
           </p:cNvPr>
@@ -10579,8 +10535,8 @@
         </p:blipFill>
         <p:spPr>
           <a:xfrm>
-            <a:off x="6371859" y="1375096"/>
-            <a:ext cx="5239481" cy="3496163"/>
+            <a:off x="6232167" y="1375096"/>
+            <a:ext cx="5087060" cy="3486637"/>
           </a:xfrm>
           <a:prstGeom prst="rect">
             <a:avLst/>
@@ -10589,10 +10545,10 @@
       </p:pic>
       <p:pic>
         <p:nvPicPr>
-          <p:cNvPr id="4" name="Picture 3">
+          <p:cNvPr id="6" name="Picture 5">
             <a:extLst>
               <a:ext uri="{FF2B5EF4-FFF2-40B4-BE49-F238E27FC236}">
-                <a16:creationId xmlns:a16="http://schemas.microsoft.com/office/drawing/2014/main" id="{F6B7762C-9865-49B8-8B3E-8D977C3191B8}"/>
+                <a16:creationId xmlns:a16="http://schemas.microsoft.com/office/drawing/2014/main" id="{2272547B-914D-469F-B97C-593E2B023269}"/>
               </a:ext>
             </a:extLst>
           </p:cNvPr>
@@ -10609,8 +10565,8 @@
         </p:blipFill>
         <p:spPr>
           <a:xfrm>
-            <a:off x="580660" y="1375096"/>
-            <a:ext cx="5577143" cy="3611174"/>
+            <a:off x="958511" y="1577501"/>
+            <a:ext cx="5001323" cy="3286584"/>
           </a:xfrm>
           <a:prstGeom prst="rect">
             <a:avLst/>
@@ -10695,7 +10651,7 @@
           <p:cNvPr id="2" name="Picture 1">
             <a:extLst>
               <a:ext uri="{FF2B5EF4-FFF2-40B4-BE49-F238E27FC236}">
-                <a16:creationId xmlns:a16="http://schemas.microsoft.com/office/drawing/2014/main" id="{96C4F937-B04F-4FB6-B472-37EEA3A305DC}"/>
+                <a16:creationId xmlns:a16="http://schemas.microsoft.com/office/drawing/2014/main" id="{10714943-AFB7-487E-8C63-457268B63756}"/>
               </a:ext>
             </a:extLst>
           </p:cNvPr>
@@ -10705,15 +10661,15 @@
           <p:nvPr/>
         </p:nvPicPr>
         <p:blipFill>
-          <a:blip r:embed="rId2"/>
+          <a:blip r:embed="rId3"/>
           <a:stretch>
             <a:fillRect/>
           </a:stretch>
         </p:blipFill>
         <p:spPr>
           <a:xfrm>
-            <a:off x="2904499" y="212323"/>
-            <a:ext cx="8973802" cy="6106377"/>
+            <a:off x="4473921" y="53266"/>
+            <a:ext cx="7156727" cy="6751467"/>
           </a:xfrm>
           <a:prstGeom prst="rect">
             <a:avLst/>
@@ -10733,7 +10689,7 @@
     </p:spTree>
     <p:extLst>
       <p:ext uri="{BB962C8B-B14F-4D97-AF65-F5344CB8AC3E}">
-        <p14:creationId xmlns:p14="http://schemas.microsoft.com/office/powerpoint/2010/main" val="3974527612"/>
+        <p14:creationId xmlns:p14="http://schemas.microsoft.com/office/powerpoint/2010/main" val="4188742258"/>
       </p:ext>
     </p:extLst>
   </p:cSld>
@@ -10828,10 +10784,10 @@
       </p:pic>
       <p:pic>
         <p:nvPicPr>
-          <p:cNvPr id="4" name="Picture 3">
+          <p:cNvPr id="5" name="Picture 4">
             <a:extLst>
               <a:ext uri="{FF2B5EF4-FFF2-40B4-BE49-F238E27FC236}">
-                <a16:creationId xmlns:a16="http://schemas.microsoft.com/office/drawing/2014/main" id="{BE12B169-0562-40AF-A819-B355845BFB36}"/>
+                <a16:creationId xmlns:a16="http://schemas.microsoft.com/office/drawing/2014/main" id="{174215E3-B1A9-4E73-BA01-F04EBD1B1412}"/>
               </a:ext>
             </a:extLst>
           </p:cNvPr>
@@ -10848,12 +10804,22 @@
         </p:blipFill>
         <p:spPr>
           <a:xfrm>
-            <a:off x="1490662" y="1095375"/>
-            <a:ext cx="8910638" cy="5326654"/>
+            <a:off x="1160478" y="1095375"/>
+            <a:ext cx="8968273" cy="5376446"/>
           </a:xfrm>
           <a:prstGeom prst="rect">
             <a:avLst/>
           </a:prstGeom>
+          <a:ln>
+            <a:noFill/>
+          </a:ln>
+          <a:effectLst>
+            <a:outerShdw blurRad="292100" dist="139700" dir="2700000" algn="tl" rotWithShape="0">
+              <a:srgbClr val="333333">
+                <a:alpha val="65000"/>
+              </a:srgbClr>
+            </a:outerShdw>
+          </a:effectLst>
         </p:spPr>
       </p:pic>
     </p:spTree>
@@ -10888,102 +10854,6 @@
       </p:grpSpPr>
       <p:sp>
         <p:nvSpPr>
-          <p:cNvPr id="7" name="Title 1">
-            <a:extLst>
-              <a:ext uri="{FF2B5EF4-FFF2-40B4-BE49-F238E27FC236}">
-                <a16:creationId xmlns:a16="http://schemas.microsoft.com/office/drawing/2014/main" id="{752C5A0A-D30B-4C6C-82DB-0C2061753A5F}"/>
-              </a:ext>
-            </a:extLst>
-          </p:cNvPr>
-          <p:cNvSpPr>
-            <a:spLocks noGrp="1"/>
-          </p:cNvSpPr>
-          <p:nvPr>
-            <p:ph type="title"/>
-          </p:nvPr>
-        </p:nvSpPr>
-        <p:spPr>
-          <a:xfrm>
-            <a:off x="275855" y="160268"/>
-            <a:ext cx="11497045" cy="1187228"/>
-          </a:xfrm>
-        </p:spPr>
-        <p:txBody>
-          <a:bodyPr>
-            <a:normAutofit/>
-          </a:bodyPr>
-          <a:lstStyle/>
-          <a:p>
-            <a:r>
-              <a:rPr lang="en-US" b="1" dirty="0"/>
-              <a:t>Visualization of  F1 Score Variance by Model Type</a:t>
-            </a:r>
-            <a:endParaRPr lang="en-CA" b="1" dirty="0"/>
-          </a:p>
-        </p:txBody>
-      </p:sp>
-      <p:pic>
-        <p:nvPicPr>
-          <p:cNvPr id="3" name="Picture 2">
-            <a:extLst>
-              <a:ext uri="{FF2B5EF4-FFF2-40B4-BE49-F238E27FC236}">
-                <a16:creationId xmlns:a16="http://schemas.microsoft.com/office/drawing/2014/main" id="{86951C0D-F079-4152-8FDE-7DAAFA255CC3}"/>
-              </a:ext>
-            </a:extLst>
-          </p:cNvPr>
-          <p:cNvPicPr>
-            <a:picLocks noChangeAspect="1"/>
-          </p:cNvPicPr>
-          <p:nvPr/>
-        </p:nvPicPr>
-        <p:blipFill>
-          <a:blip r:embed="rId3"/>
-          <a:stretch>
-            <a:fillRect/>
-          </a:stretch>
-        </p:blipFill>
-        <p:spPr>
-          <a:xfrm>
-            <a:off x="1590046" y="1042654"/>
-            <a:ext cx="9011908" cy="4772691"/>
-          </a:xfrm>
-          <a:prstGeom prst="rect">
-            <a:avLst/>
-          </a:prstGeom>
-        </p:spPr>
-      </p:pic>
-    </p:spTree>
-    <p:extLst>
-      <p:ext uri="{BB962C8B-B14F-4D97-AF65-F5344CB8AC3E}">
-        <p14:creationId xmlns:p14="http://schemas.microsoft.com/office/powerpoint/2010/main" val="944203888"/>
-      </p:ext>
-    </p:extLst>
-  </p:cSld>
-  <p:clrMapOvr>
-    <a:masterClrMapping/>
-  </p:clrMapOvr>
-</p:sld>
-</file>
-
-<file path=ppt/slides/slide19.xml><?xml version="1.0" encoding="utf-8"?>
-<p:sld xmlns:a="http://schemas.openxmlformats.org/drawingml/2006/main" xmlns:r="http://schemas.openxmlformats.org/officeDocument/2006/relationships" xmlns:p="http://schemas.openxmlformats.org/presentationml/2006/main">
-  <p:cSld>
-    <p:spTree>
-      <p:nvGrpSpPr>
-        <p:cNvPr id="1" name=""/>
-        <p:cNvGrpSpPr/>
-        <p:nvPr/>
-      </p:nvGrpSpPr>
-      <p:grpSpPr>
-        <a:xfrm>
-          <a:off x="0" y="0"/>
-          <a:ext cx="0" cy="0"/>
-          <a:chOff x="0" y="0"/>
-          <a:chExt cx="0" cy="0"/>
-        </a:xfrm>
-      </p:grpSpPr>
-      <p:sp>
-        <p:nvSpPr>
           <p:cNvPr id="5" name="Title 4">
             <a:extLst>
               <a:ext uri="{FF2B5EF4-FFF2-40B4-BE49-F238E27FC236}">
@@ -11020,10 +10890,10 @@
       </p:sp>
       <p:pic>
         <p:nvPicPr>
-          <p:cNvPr id="6" name="Picture 5">
+          <p:cNvPr id="2" name="Picture 1">
             <a:extLst>
               <a:ext uri="{FF2B5EF4-FFF2-40B4-BE49-F238E27FC236}">
-                <a16:creationId xmlns:a16="http://schemas.microsoft.com/office/drawing/2014/main" id="{B46D0DF2-B870-4534-A1F6-D22CA1F31CDC}"/>
+                <a16:creationId xmlns:a16="http://schemas.microsoft.com/office/drawing/2014/main" id="{FFF3285F-E5E6-4AA2-8D4A-13B98D9E2D2B}"/>
               </a:ext>
             </a:extLst>
           </p:cNvPr>
@@ -11040,8 +10910,8 @@
         </p:blipFill>
         <p:spPr>
           <a:xfrm>
-            <a:off x="1033462" y="1057276"/>
-            <a:ext cx="10125075" cy="5062537"/>
+            <a:off x="1188498" y="1057276"/>
+            <a:ext cx="9815004" cy="5137817"/>
           </a:xfrm>
           <a:prstGeom prst="rect">
             <a:avLst/>
@@ -11071,149 +10941,7 @@
 </p:sld>
 </file>
 
-<file path=ppt/slides/slide2.xml><?xml version="1.0" encoding="utf-8"?>
-<p:sld xmlns:a="http://schemas.openxmlformats.org/drawingml/2006/main" xmlns:r="http://schemas.openxmlformats.org/officeDocument/2006/relationships" xmlns:p="http://schemas.openxmlformats.org/presentationml/2006/main">
-  <p:cSld>
-    <p:spTree>
-      <p:nvGrpSpPr>
-        <p:cNvPr id="1" name=""/>
-        <p:cNvGrpSpPr/>
-        <p:nvPr/>
-      </p:nvGrpSpPr>
-      <p:grpSpPr>
-        <a:xfrm>
-          <a:off x="0" y="0"/>
-          <a:ext cx="0" cy="0"/>
-          <a:chOff x="0" y="0"/>
-          <a:chExt cx="0" cy="0"/>
-        </a:xfrm>
-      </p:grpSpPr>
-      <p:sp>
-        <p:nvSpPr>
-          <p:cNvPr id="4" name="Title 3">
-            <a:extLst>
-              <a:ext uri="{FF2B5EF4-FFF2-40B4-BE49-F238E27FC236}">
-                <a16:creationId xmlns:a16="http://schemas.microsoft.com/office/drawing/2014/main" id="{311E55CB-BA9F-49CC-844D-A22FA095A609}"/>
-              </a:ext>
-            </a:extLst>
-          </p:cNvPr>
-          <p:cNvSpPr>
-            <a:spLocks noGrp="1"/>
-          </p:cNvSpPr>
-          <p:nvPr>
-            <p:ph type="title"/>
-          </p:nvPr>
-        </p:nvSpPr>
-        <p:spPr/>
-        <p:txBody>
-          <a:bodyPr/>
-          <a:lstStyle/>
-          <a:p>
-            <a:r>
-              <a:rPr lang="en-US" dirty="0"/>
-              <a:t>CSML1010 – Milestone 2</a:t>
-            </a:r>
-            <a:endParaRPr lang="en-CA" dirty="0"/>
-          </a:p>
-        </p:txBody>
-      </p:sp>
-      <p:sp>
-        <p:nvSpPr>
-          <p:cNvPr id="5" name="Content Placeholder 4">
-            <a:extLst>
-              <a:ext uri="{FF2B5EF4-FFF2-40B4-BE49-F238E27FC236}">
-                <a16:creationId xmlns:a16="http://schemas.microsoft.com/office/drawing/2014/main" id="{CCEDE552-9463-4CD8-8C88-2214A514F6F2}"/>
-              </a:ext>
-            </a:extLst>
-          </p:cNvPr>
-          <p:cNvSpPr>
-            <a:spLocks noGrp="1"/>
-          </p:cNvSpPr>
-          <p:nvPr>
-            <p:ph idx="1"/>
-          </p:nvPr>
-        </p:nvSpPr>
-        <p:spPr>
-          <a:xfrm>
-            <a:off x="838200" y="1825625"/>
-            <a:ext cx="10528300" cy="4351338"/>
-          </a:xfrm>
-        </p:spPr>
-        <p:txBody>
-          <a:bodyPr>
-            <a:normAutofit/>
-          </a:bodyPr>
-          <a:lstStyle/>
-          <a:p>
-            <a:r>
-              <a:rPr lang="en-US" sz="2000" dirty="0"/>
-              <a:t>Dataset: Taskmaster-1 from Google</a:t>
-            </a:r>
-          </a:p>
-          <a:p>
-            <a:r>
-              <a:rPr lang="en-US" sz="2000" dirty="0"/>
-              <a:t>NLP Multi-Class Text Classification Problem</a:t>
-            </a:r>
-          </a:p>
-          <a:p>
-            <a:r>
-              <a:rPr lang="en-US" sz="2000" dirty="0"/>
-              <a:t>Data Preparation</a:t>
-            </a:r>
-          </a:p>
-          <a:p>
-            <a:r>
-              <a:rPr lang="en-US" sz="2000" dirty="0"/>
-              <a:t>Data Clean Up</a:t>
-            </a:r>
-          </a:p>
-          <a:p>
-            <a:r>
-              <a:rPr lang="en-US" sz="2000" dirty="0"/>
-              <a:t>Exploratory Data Analysis</a:t>
-            </a:r>
-          </a:p>
-          <a:p>
-            <a:r>
-              <a:rPr lang="en-US" sz="2000" dirty="0"/>
-              <a:t>Feature Extraction &amp; Engineering</a:t>
-            </a:r>
-          </a:p>
-          <a:p>
-            <a:r>
-              <a:rPr lang="en-US" sz="2000" dirty="0"/>
-              <a:t>Feature Scaling &amp; Selection</a:t>
-            </a:r>
-          </a:p>
-          <a:p>
-            <a:r>
-              <a:rPr lang="en-US" b="1" dirty="0"/>
-              <a:t>Modeling </a:t>
-            </a:r>
-          </a:p>
-          <a:p>
-            <a:r>
-              <a:rPr lang="en-US" b="1" dirty="0"/>
-              <a:t>Model Evaluation &amp; Tuning</a:t>
-            </a:r>
-          </a:p>
-        </p:txBody>
-      </p:sp>
-    </p:spTree>
-    <p:extLst>
-      <p:ext uri="{BB962C8B-B14F-4D97-AF65-F5344CB8AC3E}">
-        <p14:creationId xmlns:p14="http://schemas.microsoft.com/office/powerpoint/2010/main" val="1220763550"/>
-      </p:ext>
-    </p:extLst>
-  </p:cSld>
-  <p:clrMapOvr>
-    <a:masterClrMapping/>
-  </p:clrMapOvr>
-</p:sld>
-</file>
-
-<file path=ppt/slides/slide20.xml><?xml version="1.0" encoding="utf-8"?>
+<file path=ppt/slides/slide19.xml><?xml version="1.0" encoding="utf-8"?>
 <p:sld xmlns:a="http://schemas.openxmlformats.org/drawingml/2006/main" xmlns:r="http://schemas.openxmlformats.org/officeDocument/2006/relationships" xmlns:p="http://schemas.openxmlformats.org/presentationml/2006/main">
   <p:cSld>
     <p:spTree>
@@ -11784,6 +11512,148 @@
     <p:extLst>
       <p:ext uri="{BB962C8B-B14F-4D97-AF65-F5344CB8AC3E}">
         <p14:creationId xmlns:p14="http://schemas.microsoft.com/office/powerpoint/2010/main" val="1819989284"/>
+      </p:ext>
+    </p:extLst>
+  </p:cSld>
+  <p:clrMapOvr>
+    <a:masterClrMapping/>
+  </p:clrMapOvr>
+</p:sld>
+</file>
+
+<file path=ppt/slides/slide2.xml><?xml version="1.0" encoding="utf-8"?>
+<p:sld xmlns:a="http://schemas.openxmlformats.org/drawingml/2006/main" xmlns:r="http://schemas.openxmlformats.org/officeDocument/2006/relationships" xmlns:p="http://schemas.openxmlformats.org/presentationml/2006/main">
+  <p:cSld>
+    <p:spTree>
+      <p:nvGrpSpPr>
+        <p:cNvPr id="1" name=""/>
+        <p:cNvGrpSpPr/>
+        <p:nvPr/>
+      </p:nvGrpSpPr>
+      <p:grpSpPr>
+        <a:xfrm>
+          <a:off x="0" y="0"/>
+          <a:ext cx="0" cy="0"/>
+          <a:chOff x="0" y="0"/>
+          <a:chExt cx="0" cy="0"/>
+        </a:xfrm>
+      </p:grpSpPr>
+      <p:sp>
+        <p:nvSpPr>
+          <p:cNvPr id="4" name="Title 3">
+            <a:extLst>
+              <a:ext uri="{FF2B5EF4-FFF2-40B4-BE49-F238E27FC236}">
+                <a16:creationId xmlns:a16="http://schemas.microsoft.com/office/drawing/2014/main" id="{311E55CB-BA9F-49CC-844D-A22FA095A609}"/>
+              </a:ext>
+            </a:extLst>
+          </p:cNvPr>
+          <p:cNvSpPr>
+            <a:spLocks noGrp="1"/>
+          </p:cNvSpPr>
+          <p:nvPr>
+            <p:ph type="title"/>
+          </p:nvPr>
+        </p:nvSpPr>
+        <p:spPr/>
+        <p:txBody>
+          <a:bodyPr/>
+          <a:lstStyle/>
+          <a:p>
+            <a:r>
+              <a:rPr lang="en-US" dirty="0"/>
+              <a:t>CSML1010 – Milestone 2</a:t>
+            </a:r>
+            <a:endParaRPr lang="en-CA" dirty="0"/>
+          </a:p>
+        </p:txBody>
+      </p:sp>
+      <p:sp>
+        <p:nvSpPr>
+          <p:cNvPr id="5" name="Content Placeholder 4">
+            <a:extLst>
+              <a:ext uri="{FF2B5EF4-FFF2-40B4-BE49-F238E27FC236}">
+                <a16:creationId xmlns:a16="http://schemas.microsoft.com/office/drawing/2014/main" id="{CCEDE552-9463-4CD8-8C88-2214A514F6F2}"/>
+              </a:ext>
+            </a:extLst>
+          </p:cNvPr>
+          <p:cNvSpPr>
+            <a:spLocks noGrp="1"/>
+          </p:cNvSpPr>
+          <p:nvPr>
+            <p:ph idx="1"/>
+          </p:nvPr>
+        </p:nvSpPr>
+        <p:spPr>
+          <a:xfrm>
+            <a:off x="838200" y="1825625"/>
+            <a:ext cx="10528300" cy="4351338"/>
+          </a:xfrm>
+        </p:spPr>
+        <p:txBody>
+          <a:bodyPr>
+            <a:normAutofit/>
+          </a:bodyPr>
+          <a:lstStyle/>
+          <a:p>
+            <a:r>
+              <a:rPr lang="en-US" sz="2000" dirty="0"/>
+              <a:t>Dataset: Taskmaster-1 from Google</a:t>
+            </a:r>
+          </a:p>
+          <a:p>
+            <a:r>
+              <a:rPr lang="en-US" sz="2000" dirty="0"/>
+              <a:t>NLP Multi-Class Text Classification Problem</a:t>
+            </a:r>
+          </a:p>
+          <a:p>
+            <a:r>
+              <a:rPr lang="en-US" sz="2000" dirty="0"/>
+              <a:t>Data Preparation</a:t>
+            </a:r>
+          </a:p>
+          <a:p>
+            <a:r>
+              <a:rPr lang="en-US" sz="2000" dirty="0"/>
+              <a:t>Data Clean Up</a:t>
+            </a:r>
+          </a:p>
+          <a:p>
+            <a:r>
+              <a:rPr lang="en-US" sz="2000" dirty="0"/>
+              <a:t>Exploratory Data Analysis</a:t>
+            </a:r>
+          </a:p>
+          <a:p>
+            <a:r>
+              <a:rPr lang="en-US" sz="2000" dirty="0"/>
+              <a:t>Feature Extraction &amp; Engineering</a:t>
+            </a:r>
+          </a:p>
+          <a:p>
+            <a:r>
+              <a:rPr lang="en-US" sz="2000" dirty="0"/>
+              <a:t>Feature Scaling &amp; Selection</a:t>
+            </a:r>
+          </a:p>
+          <a:p>
+            <a:r>
+              <a:rPr lang="en-US" b="1" dirty="0"/>
+              <a:t>Modeling </a:t>
+            </a:r>
+          </a:p>
+          <a:p>
+            <a:r>
+              <a:rPr lang="en-US" b="1" dirty="0"/>
+              <a:t>Model Evaluation &amp; Tuning</a:t>
+            </a:r>
+          </a:p>
+        </p:txBody>
+      </p:sp>
+    </p:spTree>
+    <p:extLst>
+      <p:ext uri="{BB962C8B-B14F-4D97-AF65-F5344CB8AC3E}">
+        <p14:creationId xmlns:p14="http://schemas.microsoft.com/office/powerpoint/2010/main" val="1220763550"/>
       </p:ext>
     </p:extLst>
   </p:cSld>
@@ -14281,10 +14151,10 @@
       </p:sp>
       <p:pic>
         <p:nvPicPr>
-          <p:cNvPr id="5" name="Picture 4">
+          <p:cNvPr id="3" name="Picture 2">
             <a:extLst>
               <a:ext uri="{FF2B5EF4-FFF2-40B4-BE49-F238E27FC236}">
-                <a16:creationId xmlns:a16="http://schemas.microsoft.com/office/drawing/2014/main" id="{6E6336C9-4D8B-4F0B-A589-747784B6A414}"/>
+                <a16:creationId xmlns:a16="http://schemas.microsoft.com/office/drawing/2014/main" id="{968D72A5-ED9C-4A48-B306-8C115884B9D0}"/>
               </a:ext>
             </a:extLst>
           </p:cNvPr>
@@ -14301,8 +14171,8 @@
         </p:blipFill>
         <p:spPr>
           <a:xfrm>
-            <a:off x="6005371" y="1562544"/>
-            <a:ext cx="6020052" cy="3076132"/>
+            <a:off x="6234224" y="1562545"/>
+            <a:ext cx="5791202" cy="3014135"/>
           </a:xfrm>
           <a:prstGeom prst="rect">
             <a:avLst/>
@@ -14321,10 +14191,10 @@
       </p:pic>
       <p:pic>
         <p:nvPicPr>
-          <p:cNvPr id="7" name="Picture 6">
+          <p:cNvPr id="4" name="Picture 3">
             <a:extLst>
               <a:ext uri="{FF2B5EF4-FFF2-40B4-BE49-F238E27FC236}">
-                <a16:creationId xmlns:a16="http://schemas.microsoft.com/office/drawing/2014/main" id="{E739F819-68AA-4E24-839C-A78812B5664D}"/>
+                <a16:creationId xmlns:a16="http://schemas.microsoft.com/office/drawing/2014/main" id="{4D9EE55A-420E-4073-8316-3D7194881033}"/>
               </a:ext>
             </a:extLst>
           </p:cNvPr>
@@ -14341,8 +14211,8 @@
         </p:blipFill>
         <p:spPr>
           <a:xfrm>
-            <a:off x="250954" y="1562544"/>
-            <a:ext cx="5572903" cy="2562583"/>
+            <a:off x="166575" y="1562545"/>
+            <a:ext cx="5791202" cy="2719973"/>
           </a:xfrm>
           <a:prstGeom prst="rect">
             <a:avLst/>

</xml_diff>